<commit_message>
prepares visuals for power point now assemble
</commit_message>
<xml_diff>
--- a/chocolate_sales.pptx
+++ b/chocolate_sales.pptx
@@ -5,7 +5,7 @@
     <p:sldMasterId id="2147483672" r:id="rId1"/>
   </p:sldMasterIdLst>
   <p:notesMasterIdLst>
-    <p:notesMasterId r:id="rId9"/>
+    <p:notesMasterId r:id="rId10"/>
   </p:notesMasterIdLst>
   <p:sldIdLst>
     <p:sldId id="256" r:id="rId2"/>
@@ -13,8 +13,9 @@
     <p:sldId id="258" r:id="rId4"/>
     <p:sldId id="259" r:id="rId5"/>
     <p:sldId id="260" r:id="rId6"/>
-    <p:sldId id="261" r:id="rId7"/>
-    <p:sldId id="262" r:id="rId8"/>
+    <p:sldId id="263" r:id="rId7"/>
+    <p:sldId id="261" r:id="rId8"/>
+    <p:sldId id="262" r:id="rId9"/>
   </p:sldIdLst>
   <p:sldSz cx="12192000" cy="6858000"/>
   <p:notesSz cx="6858000" cy="9144000"/>
@@ -113,13 +114,18 @@
       </a:defRPr>
     </a:lvl9pPr>
   </p:defaultTextStyle>
+  <p:extLst>
+    <p:ext uri="{EFAFB233-063F-42B5-8137-9DF3F51BA10A}">
+      <p15:sldGuideLst xmlns:p15="http://schemas.microsoft.com/office/powerpoint/2012/main"/>
+    </p:ext>
+  </p:extLst>
 </p:presentation>
 </file>
 
 <file path=ppt/revisionInfo.xml><?xml version="1.0" encoding="utf-8"?>
 <p1510:revInfo xmlns:a="http://schemas.openxmlformats.org/drawingml/2006/main" xmlns:r="http://schemas.openxmlformats.org/officeDocument/2006/relationships" xmlns:p1510="http://schemas.microsoft.com/office/powerpoint/2015/10/main">
   <p1510:revLst>
-    <p1510:client id="{BEC3EAAE-8953-4B86-818A-C7A5BEB6D013}" v="6" dt="2025-03-08T21:11:53.731"/>
+    <p1510:client id="{BEC3EAAE-8953-4B86-818A-C7A5BEB6D013}" v="10" dt="2025-03-09T03:07:23.224"/>
   </p1510:revLst>
 </p1510:revInfo>
 </file>
@@ -129,7 +135,7 @@
   <pc:docChgLst>
     <pc:chgData name="David A. Gee" userId="e9ce1845d50193f0" providerId="LiveId" clId="{BEC3EAAE-8953-4B86-818A-C7A5BEB6D013}"/>
     <pc:docChg chg="undo custSel addSld modSld">
-      <pc:chgData name="David A. Gee" userId="e9ce1845d50193f0" providerId="LiveId" clId="{BEC3EAAE-8953-4B86-818A-C7A5BEB6D013}" dt="2025-03-08T21:25:29.017" v="1914" actId="20577"/>
+      <pc:chgData name="David A. Gee" userId="e9ce1845d50193f0" providerId="LiveId" clId="{BEC3EAAE-8953-4B86-818A-C7A5BEB6D013}" dt="2025-03-09T03:08:26.027" v="1945" actId="1076"/>
       <pc:docMkLst>
         <pc:docMk/>
       </pc:docMkLst>
@@ -284,7 +290,7 @@
         </pc:cxnChg>
       </pc:sldChg>
       <pc:sldChg chg="addSp delSp modSp new mod setBg">
-        <pc:chgData name="David A. Gee" userId="e9ce1845d50193f0" providerId="LiveId" clId="{BEC3EAAE-8953-4B86-818A-C7A5BEB6D013}" dt="2025-03-08T21:16:55.102" v="1010" actId="20577"/>
+        <pc:chgData name="David A. Gee" userId="e9ce1845d50193f0" providerId="LiveId" clId="{BEC3EAAE-8953-4B86-818A-C7A5BEB6D013}" dt="2025-03-09T01:29:09.912" v="1920" actId="26606"/>
         <pc:sldMkLst>
           <pc:docMk/>
           <pc:sldMk cId="106172727" sldId="258"/>
@@ -305,63 +311,103 @@
             <ac:spMk id="3" creationId="{242600E0-7021-9519-A205-F68C8A5713CE}"/>
           </ac:spMkLst>
         </pc:spChg>
-        <pc:spChg chg="add mod">
-          <ac:chgData name="David A. Gee" userId="e9ce1845d50193f0" providerId="LiveId" clId="{BEC3EAAE-8953-4B86-818A-C7A5BEB6D013}" dt="2025-03-08T21:16:55.102" v="1010" actId="20577"/>
+        <pc:spChg chg="add mod ord">
+          <ac:chgData name="David A. Gee" userId="e9ce1845d50193f0" providerId="LiveId" clId="{BEC3EAAE-8953-4B86-818A-C7A5BEB6D013}" dt="2025-03-09T01:29:09.912" v="1920" actId="26606"/>
           <ac:spMkLst>
             <pc:docMk/>
             <pc:sldMk cId="106172727" sldId="258"/>
             <ac:spMk id="9" creationId="{80F940E8-6D87-DDAD-0B3E-2A65D01B7E85}"/>
           </ac:spMkLst>
         </pc:spChg>
-        <pc:spChg chg="add">
-          <ac:chgData name="David A. Gee" userId="e9ce1845d50193f0" providerId="LiveId" clId="{BEC3EAAE-8953-4B86-818A-C7A5BEB6D013}" dt="2025-03-08T21:08:28.910" v="172" actId="26606"/>
+        <pc:spChg chg="add del">
+          <ac:chgData name="David A. Gee" userId="e9ce1845d50193f0" providerId="LiveId" clId="{BEC3EAAE-8953-4B86-818A-C7A5BEB6D013}" dt="2025-03-09T01:29:09.912" v="1920" actId="26606"/>
           <ac:spMkLst>
             <pc:docMk/>
             <pc:sldMk cId="106172727" sldId="258"/>
             <ac:spMk id="12" creationId="{284B70D5-875B-433D-BDBD-1522A85D6C1D}"/>
           </ac:spMkLst>
         </pc:spChg>
-        <pc:spChg chg="add">
-          <ac:chgData name="David A. Gee" userId="e9ce1845d50193f0" providerId="LiveId" clId="{BEC3EAAE-8953-4B86-818A-C7A5BEB6D013}" dt="2025-03-08T21:08:28.910" v="172" actId="26606"/>
+        <pc:spChg chg="add del">
+          <ac:chgData name="David A. Gee" userId="e9ce1845d50193f0" providerId="LiveId" clId="{BEC3EAAE-8953-4B86-818A-C7A5BEB6D013}" dt="2025-03-09T01:29:09.912" v="1920" actId="26606"/>
           <ac:spMkLst>
             <pc:docMk/>
             <pc:sldMk cId="106172727" sldId="258"/>
             <ac:spMk id="16" creationId="{1E299956-A9E7-4FC1-A0B1-D590CA9730E8}"/>
           </ac:spMkLst>
         </pc:spChg>
-        <pc:spChg chg="add">
-          <ac:chgData name="David A. Gee" userId="e9ce1845d50193f0" providerId="LiveId" clId="{BEC3EAAE-8953-4B86-818A-C7A5BEB6D013}" dt="2025-03-08T21:08:28.910" v="172" actId="26606"/>
+        <pc:spChg chg="add del">
+          <ac:chgData name="David A. Gee" userId="e9ce1845d50193f0" providerId="LiveId" clId="{BEC3EAAE-8953-4B86-818A-C7A5BEB6D013}" dt="2025-03-09T01:29:09.912" v="1920" actId="26606"/>
           <ac:spMkLst>
             <pc:docMk/>
             <pc:sldMk cId="106172727" sldId="258"/>
             <ac:spMk id="18" creationId="{17FC539C-B783-4B03-9F9E-D13430F3F64F}"/>
           </ac:spMkLst>
         </pc:spChg>
+        <pc:spChg chg="add">
+          <ac:chgData name="David A. Gee" userId="e9ce1845d50193f0" providerId="LiveId" clId="{BEC3EAAE-8953-4B86-818A-C7A5BEB6D013}" dt="2025-03-09T01:29:09.912" v="1920" actId="26606"/>
+          <ac:spMkLst>
+            <pc:docMk/>
+            <pc:sldMk cId="106172727" sldId="258"/>
+            <ac:spMk id="23" creationId="{284B70D5-875B-433D-BDBD-1522A85D6C1D}"/>
+          </ac:spMkLst>
+        </pc:spChg>
+        <pc:spChg chg="add">
+          <ac:chgData name="David A. Gee" userId="e9ce1845d50193f0" providerId="LiveId" clId="{BEC3EAAE-8953-4B86-818A-C7A5BEB6D013}" dt="2025-03-09T01:29:09.912" v="1920" actId="26606"/>
+          <ac:spMkLst>
+            <pc:docMk/>
+            <pc:sldMk cId="106172727" sldId="258"/>
+            <ac:spMk id="27" creationId="{1E299956-A9E7-4FC1-A0B1-D590CA9730E8}"/>
+          </ac:spMkLst>
+        </pc:spChg>
+        <pc:spChg chg="add">
+          <ac:chgData name="David A. Gee" userId="e9ce1845d50193f0" providerId="LiveId" clId="{BEC3EAAE-8953-4B86-818A-C7A5BEB6D013}" dt="2025-03-09T01:29:09.912" v="1920" actId="26606"/>
+          <ac:spMkLst>
+            <pc:docMk/>
+            <pc:sldMk cId="106172727" sldId="258"/>
+            <ac:spMk id="29" creationId="{17FC539C-B783-4B03-9F9E-D13430F3F64F}"/>
+          </ac:spMkLst>
+        </pc:spChg>
         <pc:picChg chg="add mod">
-          <ac:chgData name="David A. Gee" userId="e9ce1845d50193f0" providerId="LiveId" clId="{BEC3EAAE-8953-4B86-818A-C7A5BEB6D013}" dt="2025-03-08T21:08:28.910" v="172" actId="26606"/>
+          <ac:chgData name="David A. Gee" userId="e9ce1845d50193f0" providerId="LiveId" clId="{BEC3EAAE-8953-4B86-818A-C7A5BEB6D013}" dt="2025-03-09T01:29:09.912" v="1920" actId="26606"/>
+          <ac:picMkLst>
+            <pc:docMk/>
+            <pc:sldMk cId="106172727" sldId="258"/>
+            <ac:picMk id="4" creationId="{346FE6B3-2EC9-2A75-A09C-44A71B60A617}"/>
+          </ac:picMkLst>
+        </pc:picChg>
+        <pc:picChg chg="add del mod">
+          <ac:chgData name="David A. Gee" userId="e9ce1845d50193f0" providerId="LiveId" clId="{BEC3EAAE-8953-4B86-818A-C7A5BEB6D013}" dt="2025-03-09T01:28:40.908" v="1915" actId="478"/>
           <ac:picMkLst>
             <pc:docMk/>
             <pc:sldMk cId="106172727" sldId="258"/>
             <ac:picMk id="5" creationId="{47709F12-0BC5-16E4-5824-7AB70C32B0B7}"/>
           </ac:picMkLst>
         </pc:picChg>
-        <pc:cxnChg chg="add">
-          <ac:chgData name="David A. Gee" userId="e9ce1845d50193f0" providerId="LiveId" clId="{BEC3EAAE-8953-4B86-818A-C7A5BEB6D013}" dt="2025-03-08T21:08:28.910" v="172" actId="26606"/>
+        <pc:cxnChg chg="add del">
+          <ac:chgData name="David A. Gee" userId="e9ce1845d50193f0" providerId="LiveId" clId="{BEC3EAAE-8953-4B86-818A-C7A5BEB6D013}" dt="2025-03-09T01:29:09.912" v="1920" actId="26606"/>
           <ac:cxnSpMkLst>
             <pc:docMk/>
             <pc:sldMk cId="106172727" sldId="258"/>
             <ac:cxnSpMk id="14" creationId="{C947DF4A-614C-4B4C-8B80-E5B9D8E8CFED}"/>
           </ac:cxnSpMkLst>
         </pc:cxnChg>
+        <pc:cxnChg chg="add">
+          <ac:chgData name="David A. Gee" userId="e9ce1845d50193f0" providerId="LiveId" clId="{BEC3EAAE-8953-4B86-818A-C7A5BEB6D013}" dt="2025-03-09T01:29:09.912" v="1920" actId="26606"/>
+          <ac:cxnSpMkLst>
+            <pc:docMk/>
+            <pc:sldMk cId="106172727" sldId="258"/>
+            <ac:cxnSpMk id="25" creationId="{C947DF4A-614C-4B4C-8B80-E5B9D8E8CFED}"/>
+          </ac:cxnSpMkLst>
+        </pc:cxnChg>
       </pc:sldChg>
       <pc:sldChg chg="addSp delSp modSp new mod setBg">
-        <pc:chgData name="David A. Gee" userId="e9ce1845d50193f0" providerId="LiveId" clId="{BEC3EAAE-8953-4B86-818A-C7A5BEB6D013}" dt="2025-03-08T21:21:04.015" v="1239" actId="20577"/>
+        <pc:chgData name="David A. Gee" userId="e9ce1845d50193f0" providerId="LiveId" clId="{BEC3EAAE-8953-4B86-818A-C7A5BEB6D013}" dt="2025-03-09T01:29:25.375" v="1924" actId="26606"/>
         <pc:sldMkLst>
           <pc:docMk/>
           <pc:sldMk cId="2284348569" sldId="259"/>
         </pc:sldMkLst>
         <pc:spChg chg="mod">
-          <ac:chgData name="David A. Gee" userId="e9ce1845d50193f0" providerId="LiveId" clId="{BEC3EAAE-8953-4B86-818A-C7A5BEB6D013}" dt="2025-03-08T21:14:09.020" v="762" actId="404"/>
+          <ac:chgData name="David A. Gee" userId="e9ce1845d50193f0" providerId="LiveId" clId="{BEC3EAAE-8953-4B86-818A-C7A5BEB6D013}" dt="2025-03-09T01:29:25.375" v="1924" actId="26606"/>
           <ac:spMkLst>
             <pc:docMk/>
             <pc:sldMk cId="2284348569" sldId="259"/>
@@ -376,40 +422,72 @@
             <ac:spMk id="3" creationId="{7F041212-632D-6639-F707-939DF289169B}"/>
           </ac:spMkLst>
         </pc:spChg>
-        <pc:spChg chg="add mod">
-          <ac:chgData name="David A. Gee" userId="e9ce1845d50193f0" providerId="LiveId" clId="{BEC3EAAE-8953-4B86-818A-C7A5BEB6D013}" dt="2025-03-08T21:21:04.015" v="1239" actId="20577"/>
+        <pc:spChg chg="add mod ord">
+          <ac:chgData name="David A. Gee" userId="e9ce1845d50193f0" providerId="LiveId" clId="{BEC3EAAE-8953-4B86-818A-C7A5BEB6D013}" dt="2025-03-09T01:29:25.375" v="1924" actId="26606"/>
           <ac:spMkLst>
             <pc:docMk/>
             <pc:sldMk cId="2284348569" sldId="259"/>
             <ac:spMk id="9" creationId="{897F4E56-D766-2837-18CC-57E50BE46EFE}"/>
           </ac:spMkLst>
         </pc:spChg>
-        <pc:spChg chg="add">
-          <ac:chgData name="David A. Gee" userId="e9ce1845d50193f0" providerId="LiveId" clId="{BEC3EAAE-8953-4B86-818A-C7A5BEB6D013}" dt="2025-03-08T21:11:55.889" v="476" actId="26606"/>
+        <pc:spChg chg="add del">
+          <ac:chgData name="David A. Gee" userId="e9ce1845d50193f0" providerId="LiveId" clId="{BEC3EAAE-8953-4B86-818A-C7A5BEB6D013}" dt="2025-03-09T01:29:25.375" v="1924" actId="26606"/>
           <ac:spMkLst>
             <pc:docMk/>
             <pc:sldMk cId="2284348569" sldId="259"/>
             <ac:spMk id="12" creationId="{284B70D5-875B-433D-BDBD-1522A85D6C1D}"/>
           </ac:spMkLst>
         </pc:spChg>
-        <pc:spChg chg="add">
-          <ac:chgData name="David A. Gee" userId="e9ce1845d50193f0" providerId="LiveId" clId="{BEC3EAAE-8953-4B86-818A-C7A5BEB6D013}" dt="2025-03-08T21:11:55.889" v="476" actId="26606"/>
+        <pc:spChg chg="add del">
+          <ac:chgData name="David A. Gee" userId="e9ce1845d50193f0" providerId="LiveId" clId="{BEC3EAAE-8953-4B86-818A-C7A5BEB6D013}" dt="2025-03-09T01:29:25.375" v="1924" actId="26606"/>
           <ac:spMkLst>
             <pc:docMk/>
             <pc:sldMk cId="2284348569" sldId="259"/>
             <ac:spMk id="16" creationId="{1E299956-A9E7-4FC1-A0B1-D590CA9730E8}"/>
           </ac:spMkLst>
         </pc:spChg>
-        <pc:spChg chg="add">
-          <ac:chgData name="David A. Gee" userId="e9ce1845d50193f0" providerId="LiveId" clId="{BEC3EAAE-8953-4B86-818A-C7A5BEB6D013}" dt="2025-03-08T21:11:55.889" v="476" actId="26606"/>
+        <pc:spChg chg="add del">
+          <ac:chgData name="David A. Gee" userId="e9ce1845d50193f0" providerId="LiveId" clId="{BEC3EAAE-8953-4B86-818A-C7A5BEB6D013}" dt="2025-03-09T01:29:25.375" v="1924" actId="26606"/>
           <ac:spMkLst>
             <pc:docMk/>
             <pc:sldMk cId="2284348569" sldId="259"/>
             <ac:spMk id="18" creationId="{17FC539C-B783-4B03-9F9E-D13430F3F64F}"/>
           </ac:spMkLst>
         </pc:spChg>
+        <pc:spChg chg="add">
+          <ac:chgData name="David A. Gee" userId="e9ce1845d50193f0" providerId="LiveId" clId="{BEC3EAAE-8953-4B86-818A-C7A5BEB6D013}" dt="2025-03-09T01:29:25.375" v="1924" actId="26606"/>
+          <ac:spMkLst>
+            <pc:docMk/>
+            <pc:sldMk cId="2284348569" sldId="259"/>
+            <ac:spMk id="23" creationId="{284B70D5-875B-433D-BDBD-1522A85D6C1D}"/>
+          </ac:spMkLst>
+        </pc:spChg>
+        <pc:spChg chg="add">
+          <ac:chgData name="David A. Gee" userId="e9ce1845d50193f0" providerId="LiveId" clId="{BEC3EAAE-8953-4B86-818A-C7A5BEB6D013}" dt="2025-03-09T01:29:25.375" v="1924" actId="26606"/>
+          <ac:spMkLst>
+            <pc:docMk/>
+            <pc:sldMk cId="2284348569" sldId="259"/>
+            <ac:spMk id="27" creationId="{1E299956-A9E7-4FC1-A0B1-D590CA9730E8}"/>
+          </ac:spMkLst>
+        </pc:spChg>
+        <pc:spChg chg="add">
+          <ac:chgData name="David A. Gee" userId="e9ce1845d50193f0" providerId="LiveId" clId="{BEC3EAAE-8953-4B86-818A-C7A5BEB6D013}" dt="2025-03-09T01:29:25.375" v="1924" actId="26606"/>
+          <ac:spMkLst>
+            <pc:docMk/>
+            <pc:sldMk cId="2284348569" sldId="259"/>
+            <ac:spMk id="29" creationId="{17FC539C-B783-4B03-9F9E-D13430F3F64F}"/>
+          </ac:spMkLst>
+        </pc:spChg>
         <pc:picChg chg="add mod">
-          <ac:chgData name="David A. Gee" userId="e9ce1845d50193f0" providerId="LiveId" clId="{BEC3EAAE-8953-4B86-818A-C7A5BEB6D013}" dt="2025-03-08T21:11:55.889" v="476" actId="26606"/>
+          <ac:chgData name="David A. Gee" userId="e9ce1845d50193f0" providerId="LiveId" clId="{BEC3EAAE-8953-4B86-818A-C7A5BEB6D013}" dt="2025-03-09T01:29:25.375" v="1924" actId="26606"/>
+          <ac:picMkLst>
+            <pc:docMk/>
+            <pc:sldMk cId="2284348569" sldId="259"/>
+            <ac:picMk id="4" creationId="{A34EE503-9450-F633-8FFA-43F8E52C350F}"/>
+          </ac:picMkLst>
+        </pc:picChg>
+        <pc:picChg chg="add del mod">
+          <ac:chgData name="David A. Gee" userId="e9ce1845d50193f0" providerId="LiveId" clId="{BEC3EAAE-8953-4B86-818A-C7A5BEB6D013}" dt="2025-03-09T01:28:44.266" v="1916" actId="478"/>
           <ac:picMkLst>
             <pc:docMk/>
             <pc:sldMk cId="2284348569" sldId="259"/>
@@ -424,13 +502,85 @@
             <ac:cxnSpMk id="14" creationId="{C947DF4A-614C-4B4C-8B80-E5B9D8E8CFED}"/>
           </ac:cxnSpMkLst>
         </pc:cxnChg>
+        <pc:cxnChg chg="add">
+          <ac:chgData name="David A. Gee" userId="e9ce1845d50193f0" providerId="LiveId" clId="{BEC3EAAE-8953-4B86-818A-C7A5BEB6D013}" dt="2025-03-09T01:29:25.375" v="1924" actId="26606"/>
+          <ac:cxnSpMkLst>
+            <pc:docMk/>
+            <pc:sldMk cId="2284348569" sldId="259"/>
+            <ac:cxnSpMk id="25" creationId="{C947DF4A-614C-4B4C-8B80-E5B9D8E8CFED}"/>
+          </ac:cxnSpMkLst>
+        </pc:cxnChg>
       </pc:sldChg>
-      <pc:sldChg chg="new modNotesTx">
-        <pc:chgData name="David A. Gee" userId="e9ce1845d50193f0" providerId="LiveId" clId="{BEC3EAAE-8953-4B86-818A-C7A5BEB6D013}" dt="2025-03-08T21:21:57.289" v="1396" actId="20577"/>
+      <pc:sldChg chg="addSp delSp modSp new mod setBg modNotesTx">
+        <pc:chgData name="David A. Gee" userId="e9ce1845d50193f0" providerId="LiveId" clId="{BEC3EAAE-8953-4B86-818A-C7A5BEB6D013}" dt="2025-03-09T01:30:46.874" v="1930" actId="20577"/>
         <pc:sldMkLst>
           <pc:docMk/>
           <pc:sldMk cId="233070655" sldId="260"/>
         </pc:sldMkLst>
+        <pc:spChg chg="mod">
+          <ac:chgData name="David A. Gee" userId="e9ce1845d50193f0" providerId="LiveId" clId="{BEC3EAAE-8953-4B86-818A-C7A5BEB6D013}" dt="2025-03-09T01:29:37.426" v="1928" actId="26606"/>
+          <ac:spMkLst>
+            <pc:docMk/>
+            <pc:sldMk cId="233070655" sldId="260"/>
+            <ac:spMk id="2" creationId="{08206845-0B7A-D044-D8E7-0C68AE5BECDE}"/>
+          </ac:spMkLst>
+        </pc:spChg>
+        <pc:spChg chg="del">
+          <ac:chgData name="David A. Gee" userId="e9ce1845d50193f0" providerId="LiveId" clId="{BEC3EAAE-8953-4B86-818A-C7A5BEB6D013}" dt="2025-03-09T01:29:35.937" v="1925"/>
+          <ac:spMkLst>
+            <pc:docMk/>
+            <pc:sldMk cId="233070655" sldId="260"/>
+            <ac:spMk id="3" creationId="{61BF70ED-778D-355E-F84F-ABA46269311B}"/>
+          </ac:spMkLst>
+        </pc:spChg>
+        <pc:spChg chg="add">
+          <ac:chgData name="David A. Gee" userId="e9ce1845d50193f0" providerId="LiveId" clId="{BEC3EAAE-8953-4B86-818A-C7A5BEB6D013}" dt="2025-03-09T01:29:37.426" v="1928" actId="26606"/>
+          <ac:spMkLst>
+            <pc:docMk/>
+            <pc:sldMk cId="233070655" sldId="260"/>
+            <ac:spMk id="9" creationId="{AD4BB943-CFDF-03FD-1E85-C4DFE6D082A6}"/>
+          </ac:spMkLst>
+        </pc:spChg>
+        <pc:spChg chg="add">
+          <ac:chgData name="David A. Gee" userId="e9ce1845d50193f0" providerId="LiveId" clId="{BEC3EAAE-8953-4B86-818A-C7A5BEB6D013}" dt="2025-03-09T01:29:37.426" v="1928" actId="26606"/>
+          <ac:spMkLst>
+            <pc:docMk/>
+            <pc:sldMk cId="233070655" sldId="260"/>
+            <ac:spMk id="12" creationId="{284B70D5-875B-433D-BDBD-1522A85D6C1D}"/>
+          </ac:spMkLst>
+        </pc:spChg>
+        <pc:spChg chg="add">
+          <ac:chgData name="David A. Gee" userId="e9ce1845d50193f0" providerId="LiveId" clId="{BEC3EAAE-8953-4B86-818A-C7A5BEB6D013}" dt="2025-03-09T01:29:37.426" v="1928" actId="26606"/>
+          <ac:spMkLst>
+            <pc:docMk/>
+            <pc:sldMk cId="233070655" sldId="260"/>
+            <ac:spMk id="16" creationId="{1E299956-A9E7-4FC1-A0B1-D590CA9730E8}"/>
+          </ac:spMkLst>
+        </pc:spChg>
+        <pc:spChg chg="add">
+          <ac:chgData name="David A. Gee" userId="e9ce1845d50193f0" providerId="LiveId" clId="{BEC3EAAE-8953-4B86-818A-C7A5BEB6D013}" dt="2025-03-09T01:29:37.426" v="1928" actId="26606"/>
+          <ac:spMkLst>
+            <pc:docMk/>
+            <pc:sldMk cId="233070655" sldId="260"/>
+            <ac:spMk id="18" creationId="{17FC539C-B783-4B03-9F9E-D13430F3F64F}"/>
+          </ac:spMkLst>
+        </pc:spChg>
+        <pc:picChg chg="add mod">
+          <ac:chgData name="David A. Gee" userId="e9ce1845d50193f0" providerId="LiveId" clId="{BEC3EAAE-8953-4B86-818A-C7A5BEB6D013}" dt="2025-03-09T01:29:37.426" v="1928" actId="26606"/>
+          <ac:picMkLst>
+            <pc:docMk/>
+            <pc:sldMk cId="233070655" sldId="260"/>
+            <ac:picMk id="5" creationId="{0371389D-F31C-3CF7-D777-2640DD275FF2}"/>
+          </ac:picMkLst>
+        </pc:picChg>
+        <pc:cxnChg chg="add">
+          <ac:chgData name="David A. Gee" userId="e9ce1845d50193f0" providerId="LiveId" clId="{BEC3EAAE-8953-4B86-818A-C7A5BEB6D013}" dt="2025-03-09T01:29:37.426" v="1928" actId="26606"/>
+          <ac:cxnSpMkLst>
+            <pc:docMk/>
+            <pc:sldMk cId="233070655" sldId="260"/>
+            <ac:cxnSpMk id="14" creationId="{C947DF4A-614C-4B4C-8B80-E5B9D8E8CFED}"/>
+          </ac:cxnSpMkLst>
+        </pc:cxnChg>
       </pc:sldChg>
       <pc:sldChg chg="new">
         <pc:chgData name="David A. Gee" userId="e9ce1845d50193f0" providerId="LiveId" clId="{BEC3EAAE-8953-4B86-818A-C7A5BEB6D013}" dt="2025-03-08T21:22:29.932" v="1397" actId="680"/>
@@ -461,6 +611,109 @@
             <ac:spMk id="3" creationId="{B738DF57-A8C3-9D53-F410-CE63EFFB460C}"/>
           </ac:spMkLst>
         </pc:spChg>
+      </pc:sldChg>
+      <pc:sldChg chg="addSp delSp modSp add mod">
+        <pc:chgData name="David A. Gee" userId="e9ce1845d50193f0" providerId="LiveId" clId="{BEC3EAAE-8953-4B86-818A-C7A5BEB6D013}" dt="2025-03-09T03:08:26.027" v="1945" actId="1076"/>
+        <pc:sldMkLst>
+          <pc:docMk/>
+          <pc:sldMk cId="272809894" sldId="263"/>
+        </pc:sldMkLst>
+        <pc:spChg chg="mod">
+          <ac:chgData name="David A. Gee" userId="e9ce1845d50193f0" providerId="LiveId" clId="{BEC3EAAE-8953-4B86-818A-C7A5BEB6D013}" dt="2025-03-09T03:07:32.370" v="1935" actId="26606"/>
+          <ac:spMkLst>
+            <pc:docMk/>
+            <pc:sldMk cId="272809894" sldId="263"/>
+            <ac:spMk id="2" creationId="{EB74B43D-14EB-B348-476D-2BAF120DFFFB}"/>
+          </ac:spMkLst>
+        </pc:spChg>
+        <pc:spChg chg="del">
+          <ac:chgData name="David A. Gee" userId="e9ce1845d50193f0" providerId="LiveId" clId="{BEC3EAAE-8953-4B86-818A-C7A5BEB6D013}" dt="2025-03-09T03:07:23.224" v="1932"/>
+          <ac:spMkLst>
+            <pc:docMk/>
+            <pc:sldMk cId="272809894" sldId="263"/>
+            <ac:spMk id="9" creationId="{EEF21296-B6EE-8348-C2B4-838AE179284B}"/>
+          </ac:spMkLst>
+        </pc:spChg>
+        <pc:spChg chg="del">
+          <ac:chgData name="David A. Gee" userId="e9ce1845d50193f0" providerId="LiveId" clId="{BEC3EAAE-8953-4B86-818A-C7A5BEB6D013}" dt="2025-03-09T03:07:32.370" v="1935" actId="26606"/>
+          <ac:spMkLst>
+            <pc:docMk/>
+            <pc:sldMk cId="272809894" sldId="263"/>
+            <ac:spMk id="12" creationId="{91520A60-D88A-1B3F-6695-B5CF6FAA7CD4}"/>
+          </ac:spMkLst>
+        </pc:spChg>
+        <pc:spChg chg="del">
+          <ac:chgData name="David A. Gee" userId="e9ce1845d50193f0" providerId="LiveId" clId="{BEC3EAAE-8953-4B86-818A-C7A5BEB6D013}" dt="2025-03-09T03:07:32.370" v="1935" actId="26606"/>
+          <ac:spMkLst>
+            <pc:docMk/>
+            <pc:sldMk cId="272809894" sldId="263"/>
+            <ac:spMk id="16" creationId="{E6B27F31-AC14-345F-C374-5DC876043D4A}"/>
+          </ac:spMkLst>
+        </pc:spChg>
+        <pc:spChg chg="del">
+          <ac:chgData name="David A. Gee" userId="e9ce1845d50193f0" providerId="LiveId" clId="{BEC3EAAE-8953-4B86-818A-C7A5BEB6D013}" dt="2025-03-09T03:07:32.370" v="1935" actId="26606"/>
+          <ac:spMkLst>
+            <pc:docMk/>
+            <pc:sldMk cId="272809894" sldId="263"/>
+            <ac:spMk id="18" creationId="{02FB3C52-2C45-6EB5-7E10-568DE8178DA0}"/>
+          </ac:spMkLst>
+        </pc:spChg>
+        <pc:spChg chg="add">
+          <ac:chgData name="David A. Gee" userId="e9ce1845d50193f0" providerId="LiveId" clId="{BEC3EAAE-8953-4B86-818A-C7A5BEB6D013}" dt="2025-03-09T03:07:32.370" v="1935" actId="26606"/>
+          <ac:spMkLst>
+            <pc:docMk/>
+            <pc:sldMk cId="272809894" sldId="263"/>
+            <ac:spMk id="23" creationId="{25C8D2C1-DA83-420D-9635-D52CE066B5DA}"/>
+          </ac:spMkLst>
+        </pc:spChg>
+        <pc:spChg chg="add">
+          <ac:chgData name="David A. Gee" userId="e9ce1845d50193f0" providerId="LiveId" clId="{BEC3EAAE-8953-4B86-818A-C7A5BEB6D013}" dt="2025-03-09T03:07:32.370" v="1935" actId="26606"/>
+          <ac:spMkLst>
+            <pc:docMk/>
+            <pc:sldMk cId="272809894" sldId="263"/>
+            <ac:spMk id="25" creationId="{434F74C9-6A0B-409E-AD1C-45B58BE91BB8}"/>
+          </ac:spMkLst>
+        </pc:spChg>
+        <pc:spChg chg="add">
+          <ac:chgData name="David A. Gee" userId="e9ce1845d50193f0" providerId="LiveId" clId="{BEC3EAAE-8953-4B86-818A-C7A5BEB6D013}" dt="2025-03-09T03:07:32.370" v="1935" actId="26606"/>
+          <ac:spMkLst>
+            <pc:docMk/>
+            <pc:sldMk cId="272809894" sldId="263"/>
+            <ac:spMk id="29" creationId="{BE268116-E2A7-4F98-8812-192B4975E49B}"/>
+          </ac:spMkLst>
+        </pc:spChg>
+        <pc:spChg chg="add">
+          <ac:chgData name="David A. Gee" userId="e9ce1845d50193f0" providerId="LiveId" clId="{BEC3EAAE-8953-4B86-818A-C7A5BEB6D013}" dt="2025-03-09T03:07:32.370" v="1935" actId="26606"/>
+          <ac:spMkLst>
+            <pc:docMk/>
+            <pc:sldMk cId="272809894" sldId="263"/>
+            <ac:spMk id="33" creationId="{FBEFFA83-BC6D-4CD2-A2BA-98AD67423BF2}"/>
+          </ac:spMkLst>
+        </pc:spChg>
+        <pc:spChg chg="add">
+          <ac:chgData name="David A. Gee" userId="e9ce1845d50193f0" providerId="LiveId" clId="{BEC3EAAE-8953-4B86-818A-C7A5BEB6D013}" dt="2025-03-09T03:07:32.370" v="1935" actId="26606"/>
+          <ac:spMkLst>
+            <pc:docMk/>
+            <pc:sldMk cId="272809894" sldId="263"/>
+            <ac:spMk id="35" creationId="{AB5696BF-D495-4CAC-AA8A-4EBFF2C32A55}"/>
+          </ac:spMkLst>
+        </pc:spChg>
+        <pc:picChg chg="add mod modCrop">
+          <ac:chgData name="David A. Gee" userId="e9ce1845d50193f0" providerId="LiveId" clId="{BEC3EAAE-8953-4B86-818A-C7A5BEB6D013}" dt="2025-03-09T03:08:26.027" v="1945" actId="1076"/>
+          <ac:picMkLst>
+            <pc:docMk/>
+            <pc:sldMk cId="272809894" sldId="263"/>
+            <ac:picMk id="4" creationId="{145635DB-1D16-0001-D24F-CE0E67C5854F}"/>
+          </ac:picMkLst>
+        </pc:picChg>
+        <pc:picChg chg="del">
+          <ac:chgData name="David A. Gee" userId="e9ce1845d50193f0" providerId="LiveId" clId="{BEC3EAAE-8953-4B86-818A-C7A5BEB6D013}" dt="2025-03-09T01:30:51.857" v="1931" actId="478"/>
+          <ac:picMkLst>
+            <pc:docMk/>
+            <pc:sldMk cId="272809894" sldId="263"/>
+            <ac:picMk id="5" creationId="{DC9B58ED-2CEB-FCCB-87B5-0FC74BEB64DC}"/>
+          </ac:picMkLst>
+        </pc:picChg>
       </pc:sldChg>
     </pc:docChg>
   </pc:docChgLst>
@@ -944,10 +1197,7 @@
           <a:bodyPr/>
           <a:lstStyle/>
           <a:p>
-            <a:r>
-              <a:rPr lang="en-US" dirty="0"/>
-              <a:t>Need excel table with max product distribution and sales then can get back into highest grossing months</a:t>
-            </a:r>
+            <a:endParaRPr lang="en-US" dirty="0"/>
           </a:p>
         </p:txBody>
       </p:sp>
@@ -992,6 +1242,117 @@
   <p:cSld>
     <p:spTree>
       <p:nvGrpSpPr>
+        <p:cNvPr id="1" name="">
+          <a:extLst>
+            <a:ext uri="{FF2B5EF4-FFF2-40B4-BE49-F238E27FC236}">
+              <a16:creationId xmlns:a16="http://schemas.microsoft.com/office/drawing/2014/main" id="{31B1FD38-9F7F-226C-4163-0F70997974CB}"/>
+            </a:ext>
+          </a:extLst>
+        </p:cNvPr>
+        <p:cNvGrpSpPr/>
+        <p:nvPr/>
+      </p:nvGrpSpPr>
+      <p:grpSpPr>
+        <a:xfrm>
+          <a:off x="0" y="0"/>
+          <a:ext cx="0" cy="0"/>
+          <a:chOff x="0" y="0"/>
+          <a:chExt cx="0" cy="0"/>
+        </a:xfrm>
+      </p:grpSpPr>
+      <p:sp>
+        <p:nvSpPr>
+          <p:cNvPr id="2" name="Slide Image Placeholder 1">
+            <a:extLst>
+              <a:ext uri="{FF2B5EF4-FFF2-40B4-BE49-F238E27FC236}">
+                <a16:creationId xmlns:a16="http://schemas.microsoft.com/office/drawing/2014/main" id="{8140CBDA-B49A-B158-61C5-2505974D5F26}"/>
+              </a:ext>
+            </a:extLst>
+          </p:cNvPr>
+          <p:cNvSpPr>
+            <a:spLocks noGrp="1" noRot="1" noChangeAspect="1"/>
+          </p:cNvSpPr>
+          <p:nvPr>
+            <p:ph type="sldImg"/>
+          </p:nvPr>
+        </p:nvSpPr>
+        <p:spPr/>
+      </p:sp>
+      <p:sp>
+        <p:nvSpPr>
+          <p:cNvPr id="3" name="Notes Placeholder 2">
+            <a:extLst>
+              <a:ext uri="{FF2B5EF4-FFF2-40B4-BE49-F238E27FC236}">
+                <a16:creationId xmlns:a16="http://schemas.microsoft.com/office/drawing/2014/main" id="{D0E00651-6DD6-7E9F-B79A-65459052B830}"/>
+              </a:ext>
+            </a:extLst>
+          </p:cNvPr>
+          <p:cNvSpPr>
+            <a:spLocks noGrp="1"/>
+          </p:cNvSpPr>
+          <p:nvPr>
+            <p:ph type="body" idx="1"/>
+          </p:nvPr>
+        </p:nvSpPr>
+        <p:spPr/>
+        <p:txBody>
+          <a:bodyPr/>
+          <a:lstStyle/>
+          <a:p>
+            <a:r>
+              <a:rPr lang="en-US" dirty="0"/>
+              <a:t>Need excel table with max product distribution and sales then can get back into highest grossing months</a:t>
+            </a:r>
+          </a:p>
+        </p:txBody>
+      </p:sp>
+      <p:sp>
+        <p:nvSpPr>
+          <p:cNvPr id="4" name="Slide Number Placeholder 3">
+            <a:extLst>
+              <a:ext uri="{FF2B5EF4-FFF2-40B4-BE49-F238E27FC236}">
+                <a16:creationId xmlns:a16="http://schemas.microsoft.com/office/drawing/2014/main" id="{5B5DBA60-5E83-6B50-0052-1A798F38ECD4}"/>
+              </a:ext>
+            </a:extLst>
+          </p:cNvPr>
+          <p:cNvSpPr>
+            <a:spLocks noGrp="1"/>
+          </p:cNvSpPr>
+          <p:nvPr>
+            <p:ph type="sldNum" sz="quarter" idx="5"/>
+          </p:nvPr>
+        </p:nvSpPr>
+        <p:spPr/>
+        <p:txBody>
+          <a:bodyPr/>
+          <a:lstStyle/>
+          <a:p>
+            <a:fld id="{7A105F5F-2C84-484B-970F-30415024D2D8}" type="slidenum">
+              <a:rPr lang="en-US" smtClean="0"/>
+              <a:t>6</a:t>
+            </a:fld>
+            <a:endParaRPr lang="en-US"/>
+          </a:p>
+        </p:txBody>
+      </p:sp>
+    </p:spTree>
+    <p:extLst>
+      <p:ext uri="{BB962C8B-B14F-4D97-AF65-F5344CB8AC3E}">
+        <p14:creationId xmlns:p14="http://schemas.microsoft.com/office/powerpoint/2010/main" val="3178366312"/>
+      </p:ext>
+    </p:extLst>
+  </p:cSld>
+  <p:clrMapOvr>
+    <a:masterClrMapping/>
+  </p:clrMapOvr>
+</p:notes>
+</file>
+
+<file path=ppt/notesSlides/notesSlide4.xml><?xml version="1.0" encoding="utf-8"?>
+<p:notes xmlns:a="http://schemas.openxmlformats.org/drawingml/2006/main" xmlns:r="http://schemas.openxmlformats.org/officeDocument/2006/relationships" xmlns:p="http://schemas.openxmlformats.org/presentationml/2006/main">
+  <p:cSld>
+    <p:spTree>
+      <p:nvGrpSpPr>
         <p:cNvPr id="1" name=""/>
         <p:cNvGrpSpPr/>
         <p:nvPr/>
@@ -1055,7 +1416,7 @@
           <a:p>
             <a:fld id="{7A105F5F-2C84-484B-970F-30415024D2D8}" type="slidenum">
               <a:rPr lang="en-US" smtClean="0"/>
-              <a:t>7</a:t>
+              <a:t>8</a:t>
             </a:fld>
             <a:endParaRPr lang="en-US"/>
           </a:p>
@@ -5249,7 +5610,7 @@
       </p:grpSpPr>
       <p:sp useBgFill="1">
         <p:nvSpPr>
-          <p:cNvPr id="12" name="Rectangle 11">
+          <p:cNvPr id="23" name="Rectangle 22">
             <a:extLst>
               <a:ext uri="{FF2B5EF4-FFF2-40B4-BE49-F238E27FC236}">
                 <a16:creationId xmlns:a16="http://schemas.microsoft.com/office/drawing/2014/main" id="{284B70D5-875B-433D-BDBD-1522A85D6C1D}"/>
@@ -5344,10 +5705,10 @@
       </p:sp>
       <p:pic>
         <p:nvPicPr>
-          <p:cNvPr id="5" name="Content Placeholder 4" descr="A group of green bars&#10;&#10;AI-generated content may be incorrect.">
+          <p:cNvPr id="4" name="Picture 3" descr="A group of green bars&#10;&#10;AI-generated content may be incorrect.">
             <a:extLst>
               <a:ext uri="{FF2B5EF4-FFF2-40B4-BE49-F238E27FC236}">
-                <a16:creationId xmlns:a16="http://schemas.microsoft.com/office/drawing/2014/main" id="{47709F12-0BC5-16E4-5824-7AB70C32B0B7}"/>
+                <a16:creationId xmlns:a16="http://schemas.microsoft.com/office/drawing/2014/main" id="{346FE6B3-2EC9-2A75-A09C-44A71B60A617}"/>
               </a:ext>
             </a:extLst>
           </p:cNvPr>
@@ -5380,7 +5741,7 @@
       </p:pic>
       <p:cxnSp>
         <p:nvCxnSpPr>
-          <p:cNvPr id="14" name="Straight Connector 13">
+          <p:cNvPr id="25" name="Straight Connector 24">
             <a:extLst>
               <a:ext uri="{FF2B5EF4-FFF2-40B4-BE49-F238E27FC236}">
                 <a16:creationId xmlns:a16="http://schemas.microsoft.com/office/drawing/2014/main" id="{C947DF4A-614C-4B4C-8B80-E5B9D8E8CFED}"/>
@@ -5497,7 +5858,7 @@
       </p:sp>
       <p:sp>
         <p:nvSpPr>
-          <p:cNvPr id="16" name="Rectangle 15">
+          <p:cNvPr id="27" name="Rectangle 26">
             <a:extLst>
               <a:ext uri="{FF2B5EF4-FFF2-40B4-BE49-F238E27FC236}">
                 <a16:creationId xmlns:a16="http://schemas.microsoft.com/office/drawing/2014/main" id="{1E299956-A9E7-4FC1-A0B1-D590CA9730E8}"/>
@@ -5559,7 +5920,7 @@
       </p:sp>
       <p:sp>
         <p:nvSpPr>
-          <p:cNvPr id="18" name="Rectangle 17">
+          <p:cNvPr id="29" name="Rectangle 28">
             <a:extLst>
               <a:ext uri="{FF2B5EF4-FFF2-40B4-BE49-F238E27FC236}">
                 <a16:creationId xmlns:a16="http://schemas.microsoft.com/office/drawing/2014/main" id="{17FC539C-B783-4B03-9F9E-D13430F3F64F}"/>
@@ -5659,7 +6020,7 @@
       </p:grpSpPr>
       <p:sp useBgFill="1">
         <p:nvSpPr>
-          <p:cNvPr id="12" name="Rectangle 11">
+          <p:cNvPr id="23" name="Rectangle 22">
             <a:extLst>
               <a:ext uri="{FF2B5EF4-FFF2-40B4-BE49-F238E27FC236}">
                 <a16:creationId xmlns:a16="http://schemas.microsoft.com/office/drawing/2014/main" id="{284B70D5-875B-433D-BDBD-1522A85D6C1D}"/>
@@ -5741,12 +6102,12 @@
         </p:spPr>
         <p:txBody>
           <a:bodyPr>
-            <a:noAutofit/>
+            <a:normAutofit/>
           </a:bodyPr>
           <a:lstStyle/>
           <a:p>
             <a:r>
-              <a:rPr lang="en-US" sz="4000" dirty="0"/>
+              <a:rPr lang="en-US" sz="3400"/>
               <a:t>Product Distribution – Most Distributed</a:t>
             </a:r>
           </a:p>
@@ -5754,10 +6115,10 @@
       </p:sp>
       <p:pic>
         <p:nvPicPr>
-          <p:cNvPr id="5" name="Content Placeholder 4" descr="A group of green bars&#10;&#10;AI-generated content may be incorrect.">
+          <p:cNvPr id="4" name="Picture 3" descr="A group of green bars with red lines&#10;&#10;AI-generated content may be incorrect.">
             <a:extLst>
               <a:ext uri="{FF2B5EF4-FFF2-40B4-BE49-F238E27FC236}">
-                <a16:creationId xmlns:a16="http://schemas.microsoft.com/office/drawing/2014/main" id="{E16EF5AE-56D4-EFCF-C7B4-3681859EFB57}"/>
+                <a16:creationId xmlns:a16="http://schemas.microsoft.com/office/drawing/2014/main" id="{A34EE503-9450-F633-8FFA-43F8E52C350F}"/>
               </a:ext>
             </a:extLst>
           </p:cNvPr>
@@ -5790,7 +6151,7 @@
       </p:pic>
       <p:cxnSp>
         <p:nvCxnSpPr>
-          <p:cNvPr id="14" name="Straight Connector 13">
+          <p:cNvPr id="25" name="Straight Connector 24">
             <a:extLst>
               <a:ext uri="{FF2B5EF4-FFF2-40B4-BE49-F238E27FC236}">
                 <a16:creationId xmlns:a16="http://schemas.microsoft.com/office/drawing/2014/main" id="{C947DF4A-614C-4B4C-8B80-E5B9D8E8CFED}"/>
@@ -5893,7 +6254,7 @@
       </p:sp>
       <p:sp>
         <p:nvSpPr>
-          <p:cNvPr id="16" name="Rectangle 15">
+          <p:cNvPr id="27" name="Rectangle 26">
             <a:extLst>
               <a:ext uri="{FF2B5EF4-FFF2-40B4-BE49-F238E27FC236}">
                 <a16:creationId xmlns:a16="http://schemas.microsoft.com/office/drawing/2014/main" id="{1E299956-A9E7-4FC1-A0B1-D590CA9730E8}"/>
@@ -5955,7 +6316,7 @@
       </p:sp>
       <p:sp>
         <p:nvSpPr>
-          <p:cNvPr id="18" name="Rectangle 17">
+          <p:cNvPr id="29" name="Rectangle 28">
             <a:extLst>
               <a:ext uri="{FF2B5EF4-FFF2-40B4-BE49-F238E27FC236}">
                 <a16:creationId xmlns:a16="http://schemas.microsoft.com/office/drawing/2014/main" id="{17FC539C-B783-4B03-9F9E-D13430F3F64F}"/>
@@ -6031,6 +6392,14 @@
 <file path=ppt/slides/slide5.xml><?xml version="1.0" encoding="utf-8"?>
 <p:sld xmlns:a="http://schemas.openxmlformats.org/drawingml/2006/main" xmlns:r="http://schemas.openxmlformats.org/officeDocument/2006/relationships" xmlns:p="http://schemas.openxmlformats.org/presentationml/2006/main">
   <p:cSld>
+    <p:bg>
+      <p:bgPr>
+        <a:solidFill>
+          <a:schemeClr val="bg1"/>
+        </a:solidFill>
+        <a:effectLst/>
+      </p:bgPr>
+    </p:bg>
     <p:spTree>
       <p:nvGrpSpPr>
         <p:cNvPr id="1" name=""/>
@@ -6045,6 +6414,66 @@
           <a:chExt cx="0" cy="0"/>
         </a:xfrm>
       </p:grpSpPr>
+      <p:sp useBgFill="1">
+        <p:nvSpPr>
+          <p:cNvPr id="12" name="Rectangle 11">
+            <a:extLst>
+              <a:ext uri="{FF2B5EF4-FFF2-40B4-BE49-F238E27FC236}">
+                <a16:creationId xmlns:a16="http://schemas.microsoft.com/office/drawing/2014/main" id="{284B70D5-875B-433D-BDBD-1522A85D6C1D}"/>
+              </a:ext>
+              <a:ext uri="{C183D7F6-B498-43B3-948B-1728B52AA6E4}">
+                <adec:decorative xmlns:adec="http://schemas.microsoft.com/office/drawing/2017/decorative" val="1"/>
+              </a:ext>
+            </a:extLst>
+          </p:cNvPr>
+          <p:cNvSpPr>
+            <a:spLocks noGrp="1" noRot="1" noChangeAspect="1" noMove="1" noResize="1" noEditPoints="1" noAdjustHandles="1" noChangeArrowheads="1" noChangeShapeType="1" noTextEdit="1"/>
+          </p:cNvSpPr>
+          <p:nvPr>
+            <p:extLst>
+              <p:ext uri="{386F3935-93C4-4BCD-93E2-E3B085C9AB24}">
+                <p16:designElem xmlns:p16="http://schemas.microsoft.com/office/powerpoint/2015/main" val="1"/>
+              </p:ext>
+            </p:extLst>
+          </p:nvPr>
+        </p:nvSpPr>
+        <p:spPr>
+          <a:xfrm>
+            <a:off x="0" y="0"/>
+            <a:ext cx="12192001" cy="6334316"/>
+          </a:xfrm>
+          <a:prstGeom prst="rect">
+            <a:avLst/>
+          </a:prstGeom>
+          <a:ln>
+            <a:noFill/>
+          </a:ln>
+        </p:spPr>
+        <p:style>
+          <a:lnRef idx="2">
+            <a:schemeClr val="accent1">
+              <a:shade val="50000"/>
+            </a:schemeClr>
+          </a:lnRef>
+          <a:fillRef idx="1">
+            <a:schemeClr val="accent1"/>
+          </a:fillRef>
+          <a:effectRef idx="0">
+            <a:schemeClr val="accent1"/>
+          </a:effectRef>
+          <a:fontRef idx="minor">
+            <a:schemeClr val="lt1"/>
+          </a:fontRef>
+        </p:style>
+        <p:txBody>
+          <a:bodyPr rtlCol="0" anchor="ctr"/>
+          <a:lstStyle/>
+          <a:p>
+            <a:pPr algn="ctr"/>
+            <a:endParaRPr lang="en-US"/>
+          </a:p>
+        </p:txBody>
+      </p:sp>
       <p:sp>
         <p:nvSpPr>
           <p:cNvPr id="2" name="Title 1">
@@ -6061,24 +6490,123 @@
             <p:ph type="title"/>
           </p:nvPr>
         </p:nvSpPr>
-        <p:spPr/>
-        <p:txBody>
-          <a:bodyPr/>
+        <p:spPr>
+          <a:xfrm>
+            <a:off x="7859485" y="634946"/>
+            <a:ext cx="3690257" cy="1450757"/>
+          </a:xfrm>
+        </p:spPr>
+        <p:txBody>
+          <a:bodyPr>
+            <a:normAutofit/>
+          </a:bodyPr>
           <a:lstStyle/>
           <a:p>
             <a:endParaRPr lang="en-US"/>
           </a:p>
         </p:txBody>
       </p:sp>
-      <p:sp>
-        <p:nvSpPr>
-          <p:cNvPr id="3" name="Content Placeholder 2">
+      <p:pic>
+        <p:nvPicPr>
+          <p:cNvPr id="5" name="Content Placeholder 4" descr="A graph of the country's rising prices&#10;&#10;AI-generated content may be incorrect.">
             <a:extLst>
               <a:ext uri="{FF2B5EF4-FFF2-40B4-BE49-F238E27FC236}">
-                <a16:creationId xmlns:a16="http://schemas.microsoft.com/office/drawing/2014/main" id="{61BF70ED-778D-355E-F84F-ABA46269311B}"/>
+                <a16:creationId xmlns:a16="http://schemas.microsoft.com/office/drawing/2014/main" id="{0371389D-F31C-3CF7-D777-2640DD275FF2}"/>
               </a:ext>
             </a:extLst>
           </p:cNvPr>
+          <p:cNvPicPr>
+            <a:picLocks noChangeAspect="1"/>
+          </p:cNvPicPr>
+          <p:nvPr/>
+        </p:nvPicPr>
+        <p:blipFill>
+          <a:blip r:embed="rId3">
+            <a:extLst>
+              <a:ext uri="{28A0092B-C50C-407E-A947-70E740481C1C}">
+                <a14:useLocalDpi xmlns:a14="http://schemas.microsoft.com/office/drawing/2010/main" val="0"/>
+              </a:ext>
+            </a:extLst>
+          </a:blip>
+          <a:stretch>
+            <a:fillRect/>
+          </a:stretch>
+        </p:blipFill>
+        <p:spPr>
+          <a:xfrm>
+            <a:off x="633999" y="991138"/>
+            <a:ext cx="6909801" cy="4612292"/>
+          </a:xfrm>
+          <a:prstGeom prst="rect">
+            <a:avLst/>
+          </a:prstGeom>
+        </p:spPr>
+      </p:pic>
+      <p:cxnSp>
+        <p:nvCxnSpPr>
+          <p:cNvPr id="14" name="Straight Connector 13">
+            <a:extLst>
+              <a:ext uri="{FF2B5EF4-FFF2-40B4-BE49-F238E27FC236}">
+                <a16:creationId xmlns:a16="http://schemas.microsoft.com/office/drawing/2014/main" id="{C947DF4A-614C-4B4C-8B80-E5B9D8E8CFED}"/>
+              </a:ext>
+              <a:ext uri="{C183D7F6-B498-43B3-948B-1728B52AA6E4}">
+                <adec:decorative xmlns:adec="http://schemas.microsoft.com/office/drawing/2017/decorative" val="1"/>
+              </a:ext>
+            </a:extLst>
+          </p:cNvPr>
+          <p:cNvCxnSpPr>
+            <a:cxnSpLocks noGrp="1" noRot="1" noChangeAspect="1" noMove="1" noResize="1" noEditPoints="1" noAdjustHandles="1" noChangeArrowheads="1" noChangeShapeType="1"/>
+          </p:cNvCxnSpPr>
+          <p:nvPr>
+            <p:extLst>
+              <p:ext uri="{386F3935-93C4-4BCD-93E2-E3B085C9AB24}">
+                <p16:designElem xmlns:p16="http://schemas.microsoft.com/office/powerpoint/2015/main" val="1"/>
+              </p:ext>
+            </p:extLst>
+          </p:nvPr>
+        </p:nvCxnSpPr>
+        <p:spPr>
+          <a:xfrm>
+            <a:off x="7892143" y="2085703"/>
+            <a:ext cx="3566160" cy="0"/>
+          </a:xfrm>
+          <a:prstGeom prst="line">
+            <a:avLst/>
+          </a:prstGeom>
+          <a:ln w="6350">
+            <a:solidFill>
+              <a:schemeClr val="tx1">
+                <a:lumMod val="50000"/>
+                <a:lumOff val="50000"/>
+                <a:alpha val="90000"/>
+              </a:schemeClr>
+            </a:solidFill>
+          </a:ln>
+        </p:spPr>
+        <p:style>
+          <a:lnRef idx="1">
+            <a:schemeClr val="accent1"/>
+          </a:lnRef>
+          <a:fillRef idx="0">
+            <a:schemeClr val="accent1"/>
+          </a:fillRef>
+          <a:effectRef idx="0">
+            <a:schemeClr val="accent1"/>
+          </a:effectRef>
+          <a:fontRef idx="minor">
+            <a:schemeClr val="tx1"/>
+          </a:fontRef>
+        </p:style>
+      </p:cxnSp>
+      <p:sp>
+        <p:nvSpPr>
+          <p:cNvPr id="9" name="Content Placeholder 8">
+            <a:extLst>
+              <a:ext uri="{FF2B5EF4-FFF2-40B4-BE49-F238E27FC236}">
+                <a16:creationId xmlns:a16="http://schemas.microsoft.com/office/drawing/2014/main" id="{AD4BB943-CFDF-03FD-1E85-C4DFE6D082A6}"/>
+              </a:ext>
+            </a:extLst>
+          </p:cNvPr>
           <p:cNvSpPr>
             <a:spLocks noGrp="1"/>
           </p:cNvSpPr>
@@ -6086,7 +6614,138 @@
             <p:ph idx="1"/>
           </p:nvPr>
         </p:nvSpPr>
-        <p:spPr/>
+        <p:spPr>
+          <a:xfrm>
+            <a:off x="7859485" y="2198914"/>
+            <a:ext cx="3690257" cy="3670180"/>
+          </a:xfrm>
+        </p:spPr>
+        <p:txBody>
+          <a:bodyPr>
+            <a:normAutofit/>
+          </a:bodyPr>
+          <a:lstStyle/>
+          <a:p>
+            <a:endParaRPr lang="en-US"/>
+          </a:p>
+        </p:txBody>
+      </p:sp>
+      <p:sp>
+        <p:nvSpPr>
+          <p:cNvPr id="16" name="Rectangle 15">
+            <a:extLst>
+              <a:ext uri="{FF2B5EF4-FFF2-40B4-BE49-F238E27FC236}">
+                <a16:creationId xmlns:a16="http://schemas.microsoft.com/office/drawing/2014/main" id="{1E299956-A9E7-4FC1-A0B1-D590CA9730E8}"/>
+              </a:ext>
+              <a:ext uri="{C183D7F6-B498-43B3-948B-1728B52AA6E4}">
+                <adec:decorative xmlns:adec="http://schemas.microsoft.com/office/drawing/2017/decorative" val="1"/>
+              </a:ext>
+            </a:extLst>
+          </p:cNvPr>
+          <p:cNvSpPr>
+            <a:spLocks noGrp="1" noRot="1" noChangeAspect="1" noMove="1" noResize="1" noEditPoints="1" noAdjustHandles="1" noChangeArrowheads="1" noChangeShapeType="1" noTextEdit="1"/>
+          </p:cNvSpPr>
+          <p:nvPr>
+            <p:extLst>
+              <p:ext uri="{386F3935-93C4-4BCD-93E2-E3B085C9AB24}">
+                <p16:designElem xmlns:p16="http://schemas.microsoft.com/office/powerpoint/2015/main" val="1"/>
+              </p:ext>
+            </p:extLst>
+          </p:nvPr>
+        </p:nvSpPr>
+        <p:spPr>
+          <a:xfrm>
+            <a:off x="15" y="6334316"/>
+            <a:ext cx="12191985" cy="66484"/>
+          </a:xfrm>
+          <a:prstGeom prst="rect">
+            <a:avLst/>
+          </a:prstGeom>
+          <a:solidFill>
+            <a:schemeClr val="accent1"/>
+          </a:solidFill>
+          <a:ln>
+            <a:noFill/>
+          </a:ln>
+        </p:spPr>
+        <p:style>
+          <a:lnRef idx="2">
+            <a:schemeClr val="accent1">
+              <a:shade val="50000"/>
+            </a:schemeClr>
+          </a:lnRef>
+          <a:fillRef idx="1">
+            <a:schemeClr val="accent1"/>
+          </a:fillRef>
+          <a:effectRef idx="0">
+            <a:schemeClr val="accent1"/>
+          </a:effectRef>
+          <a:fontRef idx="minor">
+            <a:schemeClr val="lt1"/>
+          </a:fontRef>
+        </p:style>
+        <p:txBody>
+          <a:bodyPr/>
+          <a:lstStyle/>
+          <a:p>
+            <a:endParaRPr lang="en-US"/>
+          </a:p>
+        </p:txBody>
+      </p:sp>
+      <p:sp>
+        <p:nvSpPr>
+          <p:cNvPr id="18" name="Rectangle 17">
+            <a:extLst>
+              <a:ext uri="{FF2B5EF4-FFF2-40B4-BE49-F238E27FC236}">
+                <a16:creationId xmlns:a16="http://schemas.microsoft.com/office/drawing/2014/main" id="{17FC539C-B783-4B03-9F9E-D13430F3F64F}"/>
+              </a:ext>
+              <a:ext uri="{C183D7F6-B498-43B3-948B-1728B52AA6E4}">
+                <adec:decorative xmlns:adec="http://schemas.microsoft.com/office/drawing/2017/decorative" val="1"/>
+              </a:ext>
+            </a:extLst>
+          </p:cNvPr>
+          <p:cNvSpPr>
+            <a:spLocks noGrp="1" noRot="1" noChangeAspect="1" noMove="1" noResize="1" noEditPoints="1" noAdjustHandles="1" noChangeArrowheads="1" noChangeShapeType="1" noTextEdit="1"/>
+          </p:cNvSpPr>
+          <p:nvPr>
+            <p:extLst>
+              <p:ext uri="{386F3935-93C4-4BCD-93E2-E3B085C9AB24}">
+                <p16:designElem xmlns:p16="http://schemas.microsoft.com/office/powerpoint/2015/main" val="1"/>
+              </p:ext>
+            </p:extLst>
+          </p:nvPr>
+        </p:nvSpPr>
+        <p:spPr>
+          <a:xfrm>
+            <a:off x="1" y="6400800"/>
+            <a:ext cx="12192000" cy="457200"/>
+          </a:xfrm>
+          <a:prstGeom prst="rect">
+            <a:avLst/>
+          </a:prstGeom>
+          <a:solidFill>
+            <a:schemeClr val="accent2"/>
+          </a:solidFill>
+          <a:ln>
+            <a:noFill/>
+          </a:ln>
+        </p:spPr>
+        <p:style>
+          <a:lnRef idx="2">
+            <a:schemeClr val="accent1">
+              <a:shade val="50000"/>
+            </a:schemeClr>
+          </a:lnRef>
+          <a:fillRef idx="1">
+            <a:schemeClr val="accent1"/>
+          </a:fillRef>
+          <a:effectRef idx="0">
+            <a:schemeClr val="accent1"/>
+          </a:effectRef>
+          <a:fontRef idx="minor">
+            <a:schemeClr val="lt1"/>
+          </a:fontRef>
+        </p:style>
         <p:txBody>
           <a:bodyPr/>
           <a:lstStyle/>
@@ -6111,6 +6770,543 @@
 <file path=ppt/slides/slide6.xml><?xml version="1.0" encoding="utf-8"?>
 <p:sld xmlns:a="http://schemas.openxmlformats.org/drawingml/2006/main" xmlns:r="http://schemas.openxmlformats.org/officeDocument/2006/relationships" xmlns:p="http://schemas.openxmlformats.org/presentationml/2006/main">
   <p:cSld>
+    <p:bg>
+      <p:bgPr>
+        <a:solidFill>
+          <a:schemeClr val="bg1"/>
+        </a:solidFill>
+        <a:effectLst/>
+      </p:bgPr>
+    </p:bg>
+    <p:spTree>
+      <p:nvGrpSpPr>
+        <p:cNvPr id="1" name="">
+          <a:extLst>
+            <a:ext uri="{FF2B5EF4-FFF2-40B4-BE49-F238E27FC236}">
+              <a16:creationId xmlns:a16="http://schemas.microsoft.com/office/drawing/2014/main" id="{EB1D4BB8-EEBB-A993-3B02-FCCF34389390}"/>
+            </a:ext>
+          </a:extLst>
+        </p:cNvPr>
+        <p:cNvGrpSpPr/>
+        <p:nvPr/>
+      </p:nvGrpSpPr>
+      <p:grpSpPr>
+        <a:xfrm>
+          <a:off x="0" y="0"/>
+          <a:ext cx="0" cy="0"/>
+          <a:chOff x="0" y="0"/>
+          <a:chExt cx="0" cy="0"/>
+        </a:xfrm>
+      </p:grpSpPr>
+      <p:sp>
+        <p:nvSpPr>
+          <p:cNvPr id="23" name="Rectangle 22">
+            <a:extLst>
+              <a:ext uri="{FF2B5EF4-FFF2-40B4-BE49-F238E27FC236}">
+                <a16:creationId xmlns:a16="http://schemas.microsoft.com/office/drawing/2014/main" id="{25C8D2C1-DA83-420D-9635-D52CE066B5DA}"/>
+              </a:ext>
+              <a:ext uri="{C183D7F6-B498-43B3-948B-1728B52AA6E4}">
+                <adec:decorative xmlns:adec="http://schemas.microsoft.com/office/drawing/2017/decorative" val="1"/>
+              </a:ext>
+            </a:extLst>
+          </p:cNvPr>
+          <p:cNvSpPr>
+            <a:spLocks noGrp="1" noRot="1" noChangeAspect="1" noMove="1" noResize="1" noEditPoints="1" noAdjustHandles="1" noChangeArrowheads="1" noChangeShapeType="1" noTextEdit="1"/>
+          </p:cNvSpPr>
+          <p:nvPr>
+            <p:extLst>
+              <p:ext uri="{386F3935-93C4-4BCD-93E2-E3B085C9AB24}">
+                <p16:designElem xmlns:p16="http://schemas.microsoft.com/office/powerpoint/2015/main" val="1"/>
+              </p:ext>
+            </p:extLst>
+          </p:nvPr>
+        </p:nvSpPr>
+        <p:spPr>
+          <a:xfrm>
+            <a:off x="3175" y="6400800"/>
+            <a:ext cx="12188825" cy="457200"/>
+          </a:xfrm>
+          <a:prstGeom prst="rect">
+            <a:avLst/>
+          </a:prstGeom>
+          <a:solidFill>
+            <a:schemeClr val="accent2"/>
+          </a:solidFill>
+          <a:ln>
+            <a:noFill/>
+          </a:ln>
+        </p:spPr>
+        <p:style>
+          <a:lnRef idx="2">
+            <a:schemeClr val="accent1">
+              <a:shade val="50000"/>
+            </a:schemeClr>
+          </a:lnRef>
+          <a:fillRef idx="1">
+            <a:schemeClr val="accent1"/>
+          </a:fillRef>
+          <a:effectRef idx="0">
+            <a:schemeClr val="accent1"/>
+          </a:effectRef>
+          <a:fontRef idx="minor">
+            <a:schemeClr val="lt1"/>
+          </a:fontRef>
+        </p:style>
+        <p:txBody>
+          <a:bodyPr/>
+          <a:lstStyle/>
+          <a:p>
+            <a:endParaRPr lang="en-US"/>
+          </a:p>
+        </p:txBody>
+      </p:sp>
+      <p:sp>
+        <p:nvSpPr>
+          <p:cNvPr id="25" name="Rectangle 24">
+            <a:extLst>
+              <a:ext uri="{FF2B5EF4-FFF2-40B4-BE49-F238E27FC236}">
+                <a16:creationId xmlns:a16="http://schemas.microsoft.com/office/drawing/2014/main" id="{434F74C9-6A0B-409E-AD1C-45B58BE91BB8}"/>
+              </a:ext>
+              <a:ext uri="{C183D7F6-B498-43B3-948B-1728B52AA6E4}">
+                <adec:decorative xmlns:adec="http://schemas.microsoft.com/office/drawing/2017/decorative" val="1"/>
+              </a:ext>
+            </a:extLst>
+          </p:cNvPr>
+          <p:cNvSpPr>
+            <a:spLocks noGrp="1" noRot="1" noChangeAspect="1" noMove="1" noResize="1" noEditPoints="1" noAdjustHandles="1" noChangeArrowheads="1" noChangeShapeType="1" noTextEdit="1"/>
+          </p:cNvSpPr>
+          <p:nvPr>
+            <p:extLst>
+              <p:ext uri="{386F3935-93C4-4BCD-93E2-E3B085C9AB24}">
+                <p16:designElem xmlns:p16="http://schemas.microsoft.com/office/powerpoint/2015/main" val="1"/>
+              </p:ext>
+            </p:extLst>
+          </p:nvPr>
+        </p:nvSpPr>
+        <p:spPr>
+          <a:xfrm>
+            <a:off x="15" y="6334316"/>
+            <a:ext cx="12188825" cy="64008"/>
+          </a:xfrm>
+          <a:prstGeom prst="rect">
+            <a:avLst/>
+          </a:prstGeom>
+          <a:solidFill>
+            <a:schemeClr val="accent1"/>
+          </a:solidFill>
+          <a:ln>
+            <a:noFill/>
+          </a:ln>
+        </p:spPr>
+        <p:style>
+          <a:lnRef idx="2">
+            <a:schemeClr val="accent1">
+              <a:shade val="50000"/>
+            </a:schemeClr>
+          </a:lnRef>
+          <a:fillRef idx="1">
+            <a:schemeClr val="accent1"/>
+          </a:fillRef>
+          <a:effectRef idx="0">
+            <a:schemeClr val="accent1"/>
+          </a:effectRef>
+          <a:fontRef idx="minor">
+            <a:schemeClr val="lt1"/>
+          </a:fontRef>
+        </p:style>
+        <p:txBody>
+          <a:bodyPr/>
+          <a:lstStyle/>
+          <a:p>
+            <a:endParaRPr lang="en-US"/>
+          </a:p>
+        </p:txBody>
+      </p:sp>
+      <p:cxnSp>
+        <p:nvCxnSpPr>
+          <p:cNvPr id="27" name="Straight Connector 26">
+            <a:extLst>
+              <a:ext uri="{FF2B5EF4-FFF2-40B4-BE49-F238E27FC236}">
+                <a16:creationId xmlns:a16="http://schemas.microsoft.com/office/drawing/2014/main" id="{F5486A9D-1265-4B57-91E6-68E666B978BC}"/>
+              </a:ext>
+              <a:ext uri="{C183D7F6-B498-43B3-948B-1728B52AA6E4}">
+                <adec:decorative xmlns:adec="http://schemas.microsoft.com/office/drawing/2017/decorative" val="1"/>
+              </a:ext>
+            </a:extLst>
+          </p:cNvPr>
+          <p:cNvCxnSpPr>
+            <a:cxnSpLocks noGrp="1" noRot="1" noChangeAspect="1" noMove="1" noResize="1" noEditPoints="1" noAdjustHandles="1" noChangeArrowheads="1" noChangeShapeType="1"/>
+          </p:cNvCxnSpPr>
+          <p:nvPr>
+            <p:extLst>
+              <p:ext uri="{386F3935-93C4-4BCD-93E2-E3B085C9AB24}">
+                <p16:designElem xmlns:p16="http://schemas.microsoft.com/office/powerpoint/2015/main" val="1"/>
+              </p:ext>
+            </p:extLst>
+          </p:nvPr>
+        </p:nvCxnSpPr>
+        <p:spPr>
+          <a:xfrm>
+            <a:off x="1207658" y="4343400"/>
+            <a:ext cx="9875520" cy="0"/>
+          </a:xfrm>
+          <a:prstGeom prst="line">
+            <a:avLst/>
+          </a:prstGeom>
+          <a:ln w="6350">
+            <a:solidFill>
+              <a:schemeClr val="tx1">
+                <a:lumMod val="50000"/>
+                <a:lumOff val="50000"/>
+              </a:schemeClr>
+            </a:solidFill>
+          </a:ln>
+        </p:spPr>
+        <p:style>
+          <a:lnRef idx="1">
+            <a:schemeClr val="accent1"/>
+          </a:lnRef>
+          <a:fillRef idx="0">
+            <a:schemeClr val="accent1"/>
+          </a:fillRef>
+          <a:effectRef idx="0">
+            <a:schemeClr val="accent1"/>
+          </a:effectRef>
+          <a:fontRef idx="minor">
+            <a:schemeClr val="tx1"/>
+          </a:fontRef>
+        </p:style>
+      </p:cxnSp>
+      <p:sp useBgFill="1">
+        <p:nvSpPr>
+          <p:cNvPr id="29" name="Rectangle 28">
+            <a:extLst>
+              <a:ext uri="{FF2B5EF4-FFF2-40B4-BE49-F238E27FC236}">
+                <a16:creationId xmlns:a16="http://schemas.microsoft.com/office/drawing/2014/main" id="{BE268116-E2A7-4F98-8812-192B4975E49B}"/>
+              </a:ext>
+              <a:ext uri="{C183D7F6-B498-43B3-948B-1728B52AA6E4}">
+                <adec:decorative xmlns:adec="http://schemas.microsoft.com/office/drawing/2017/decorative" val="1"/>
+              </a:ext>
+            </a:extLst>
+          </p:cNvPr>
+          <p:cNvSpPr>
+            <a:spLocks noGrp="1" noRot="1" noChangeAspect="1" noMove="1" noResize="1" noEditPoints="1" noAdjustHandles="1" noChangeArrowheads="1" noChangeShapeType="1" noTextEdit="1"/>
+          </p:cNvSpPr>
+          <p:nvPr>
+            <p:extLst>
+              <p:ext uri="{386F3935-93C4-4BCD-93E2-E3B085C9AB24}">
+                <p16:designElem xmlns:p16="http://schemas.microsoft.com/office/powerpoint/2015/main" val="1"/>
+              </p:ext>
+            </p:extLst>
+          </p:nvPr>
+        </p:nvSpPr>
+        <p:spPr>
+          <a:xfrm>
+            <a:off x="0" y="0"/>
+            <a:ext cx="12192001" cy="6334316"/>
+          </a:xfrm>
+          <a:prstGeom prst="rect">
+            <a:avLst/>
+          </a:prstGeom>
+          <a:ln>
+            <a:noFill/>
+          </a:ln>
+        </p:spPr>
+        <p:style>
+          <a:lnRef idx="2">
+            <a:schemeClr val="accent1">
+              <a:shade val="50000"/>
+            </a:schemeClr>
+          </a:lnRef>
+          <a:fillRef idx="1">
+            <a:schemeClr val="accent1"/>
+          </a:fillRef>
+          <a:effectRef idx="0">
+            <a:schemeClr val="accent1"/>
+          </a:effectRef>
+          <a:fontRef idx="minor">
+            <a:schemeClr val="lt1"/>
+          </a:fontRef>
+        </p:style>
+        <p:txBody>
+          <a:bodyPr rtlCol="0" anchor="ctr"/>
+          <a:lstStyle/>
+          <a:p>
+            <a:pPr algn="ctr"/>
+            <a:endParaRPr lang="en-US"/>
+          </a:p>
+        </p:txBody>
+      </p:sp>
+      <p:sp>
+        <p:nvSpPr>
+          <p:cNvPr id="2" name="Title 1">
+            <a:extLst>
+              <a:ext uri="{FF2B5EF4-FFF2-40B4-BE49-F238E27FC236}">
+                <a16:creationId xmlns:a16="http://schemas.microsoft.com/office/drawing/2014/main" id="{EB74B43D-14EB-B348-476D-2BAF120DFFFB}"/>
+              </a:ext>
+            </a:extLst>
+          </p:cNvPr>
+          <p:cNvSpPr>
+            <a:spLocks noGrp="1"/>
+          </p:cNvSpPr>
+          <p:nvPr>
+            <p:ph type="title"/>
+          </p:nvPr>
+        </p:nvSpPr>
+        <p:spPr>
+          <a:xfrm>
+            <a:off x="633999" y="4550229"/>
+            <a:ext cx="10909073" cy="1057655"/>
+          </a:xfrm>
+        </p:spPr>
+        <p:txBody>
+          <a:bodyPr vert="horz" lIns="91440" tIns="45720" rIns="91440" bIns="45720" rtlCol="0" anchor="b">
+            <a:normAutofit/>
+          </a:bodyPr>
+          <a:lstStyle/>
+          <a:p>
+            <a:endParaRPr lang="en-US" sz="6000">
+              <a:solidFill>
+                <a:schemeClr val="tx1">
+                  <a:lumMod val="85000"/>
+                  <a:lumOff val="15000"/>
+                </a:schemeClr>
+              </a:solidFill>
+            </a:endParaRPr>
+          </a:p>
+        </p:txBody>
+      </p:sp>
+      <p:pic>
+        <p:nvPicPr>
+          <p:cNvPr id="4" name="Content Placeholder 3" descr="A table with a green and white background&#10;&#10;AI-generated content may be incorrect.">
+            <a:extLst>
+              <a:ext uri="{FF2B5EF4-FFF2-40B4-BE49-F238E27FC236}">
+                <a16:creationId xmlns:a16="http://schemas.microsoft.com/office/drawing/2014/main" id="{145635DB-1D16-0001-D24F-CE0E67C5854F}"/>
+              </a:ext>
+            </a:extLst>
+          </p:cNvPr>
+          <p:cNvPicPr>
+            <a:picLocks noGrp="1" noChangeAspect="1"/>
+          </p:cNvPicPr>
+          <p:nvPr>
+            <p:ph idx="1"/>
+          </p:nvPr>
+        </p:nvPicPr>
+        <p:blipFill>
+          <a:blip r:embed="rId3">
+            <a:extLst>
+              <a:ext uri="{28A0092B-C50C-407E-A947-70E740481C1C}">
+                <a14:useLocalDpi xmlns:a14="http://schemas.microsoft.com/office/drawing/2010/main" val="0"/>
+              </a:ext>
+            </a:extLst>
+          </a:blip>
+          <a:srcRect l="11968" t="36173" r="8952" b="34471"/>
+          <a:stretch/>
+        </p:blipFill>
+        <p:spPr>
+          <a:xfrm>
+            <a:off x="123331" y="1268408"/>
+            <a:ext cx="11711110" cy="1282522"/>
+          </a:xfrm>
+          <a:prstGeom prst="rect">
+            <a:avLst/>
+          </a:prstGeom>
+        </p:spPr>
+      </p:pic>
+      <p:cxnSp>
+        <p:nvCxnSpPr>
+          <p:cNvPr id="31" name="Straight Connector 30">
+            <a:extLst>
+              <a:ext uri="{FF2B5EF4-FFF2-40B4-BE49-F238E27FC236}">
+                <a16:creationId xmlns:a16="http://schemas.microsoft.com/office/drawing/2014/main" id="{73D8893D-DEBE-4F67-901F-166F75E9C6E7}"/>
+              </a:ext>
+              <a:ext uri="{C183D7F6-B498-43B3-948B-1728B52AA6E4}">
+                <adec:decorative xmlns:adec="http://schemas.microsoft.com/office/drawing/2017/decorative" val="1"/>
+              </a:ext>
+            </a:extLst>
+          </p:cNvPr>
+          <p:cNvCxnSpPr>
+            <a:cxnSpLocks noGrp="1" noRot="1" noChangeAspect="1" noMove="1" noResize="1" noEditPoints="1" noAdjustHandles="1" noChangeArrowheads="1" noChangeShapeType="1"/>
+          </p:cNvCxnSpPr>
+          <p:nvPr>
+            <p:extLst>
+              <p:ext uri="{386F3935-93C4-4BCD-93E2-E3B085C9AB24}">
+                <p16:designElem xmlns:p16="http://schemas.microsoft.com/office/powerpoint/2015/main" val="1"/>
+              </p:ext>
+            </p:extLst>
+          </p:nvPr>
+        </p:nvCxnSpPr>
+        <p:spPr>
+          <a:xfrm>
+            <a:off x="721086" y="5618770"/>
+            <a:ext cx="10515600" cy="0"/>
+          </a:xfrm>
+          <a:prstGeom prst="line">
+            <a:avLst/>
+          </a:prstGeom>
+          <a:ln w="6350">
+            <a:solidFill>
+              <a:schemeClr val="tx2">
+                <a:alpha val="90000"/>
+              </a:schemeClr>
+            </a:solidFill>
+          </a:ln>
+        </p:spPr>
+        <p:style>
+          <a:lnRef idx="1">
+            <a:schemeClr val="accent1"/>
+          </a:lnRef>
+          <a:fillRef idx="0">
+            <a:schemeClr val="accent1"/>
+          </a:fillRef>
+          <a:effectRef idx="0">
+            <a:schemeClr val="accent1"/>
+          </a:effectRef>
+          <a:fontRef idx="minor">
+            <a:schemeClr val="tx1"/>
+          </a:fontRef>
+        </p:style>
+      </p:cxnSp>
+      <p:sp>
+        <p:nvSpPr>
+          <p:cNvPr id="33" name="Rectangle 32">
+            <a:extLst>
+              <a:ext uri="{FF2B5EF4-FFF2-40B4-BE49-F238E27FC236}">
+                <a16:creationId xmlns:a16="http://schemas.microsoft.com/office/drawing/2014/main" id="{FBEFFA83-BC6D-4CD2-A2BA-98AD67423BF2}"/>
+              </a:ext>
+              <a:ext uri="{C183D7F6-B498-43B3-948B-1728B52AA6E4}">
+                <adec:decorative xmlns:adec="http://schemas.microsoft.com/office/drawing/2017/decorative" val="1"/>
+              </a:ext>
+            </a:extLst>
+          </p:cNvPr>
+          <p:cNvSpPr>
+            <a:spLocks noGrp="1" noRot="1" noChangeAspect="1" noMove="1" noResize="1" noEditPoints="1" noAdjustHandles="1" noChangeArrowheads="1" noChangeShapeType="1" noTextEdit="1"/>
+          </p:cNvSpPr>
+          <p:nvPr>
+            <p:extLst>
+              <p:ext uri="{386F3935-93C4-4BCD-93E2-E3B085C9AB24}">
+                <p16:designElem xmlns:p16="http://schemas.microsoft.com/office/powerpoint/2015/main" val="1"/>
+              </p:ext>
+            </p:extLst>
+          </p:nvPr>
+        </p:nvSpPr>
+        <p:spPr>
+          <a:xfrm>
+            <a:off x="15" y="6334316"/>
+            <a:ext cx="12191985" cy="66484"/>
+          </a:xfrm>
+          <a:prstGeom prst="rect">
+            <a:avLst/>
+          </a:prstGeom>
+          <a:solidFill>
+            <a:schemeClr val="accent1"/>
+          </a:solidFill>
+          <a:ln>
+            <a:noFill/>
+          </a:ln>
+        </p:spPr>
+        <p:style>
+          <a:lnRef idx="2">
+            <a:schemeClr val="accent1">
+              <a:shade val="50000"/>
+            </a:schemeClr>
+          </a:lnRef>
+          <a:fillRef idx="1">
+            <a:schemeClr val="accent1"/>
+          </a:fillRef>
+          <a:effectRef idx="0">
+            <a:schemeClr val="accent1"/>
+          </a:effectRef>
+          <a:fontRef idx="minor">
+            <a:schemeClr val="lt1"/>
+          </a:fontRef>
+        </p:style>
+        <p:txBody>
+          <a:bodyPr/>
+          <a:lstStyle/>
+          <a:p>
+            <a:endParaRPr lang="en-US"/>
+          </a:p>
+        </p:txBody>
+      </p:sp>
+      <p:sp>
+        <p:nvSpPr>
+          <p:cNvPr id="35" name="Rectangle 34">
+            <a:extLst>
+              <a:ext uri="{FF2B5EF4-FFF2-40B4-BE49-F238E27FC236}">
+                <a16:creationId xmlns:a16="http://schemas.microsoft.com/office/drawing/2014/main" id="{AB5696BF-D495-4CAC-AA8A-4EBFF2C32A55}"/>
+              </a:ext>
+              <a:ext uri="{C183D7F6-B498-43B3-948B-1728B52AA6E4}">
+                <adec:decorative xmlns:adec="http://schemas.microsoft.com/office/drawing/2017/decorative" val="1"/>
+              </a:ext>
+            </a:extLst>
+          </p:cNvPr>
+          <p:cNvSpPr>
+            <a:spLocks noGrp="1" noRot="1" noChangeAspect="1" noMove="1" noResize="1" noEditPoints="1" noAdjustHandles="1" noChangeArrowheads="1" noChangeShapeType="1" noTextEdit="1"/>
+          </p:cNvSpPr>
+          <p:nvPr>
+            <p:extLst>
+              <p:ext uri="{386F3935-93C4-4BCD-93E2-E3B085C9AB24}">
+                <p16:designElem xmlns:p16="http://schemas.microsoft.com/office/powerpoint/2015/main" val="1"/>
+              </p:ext>
+            </p:extLst>
+          </p:nvPr>
+        </p:nvSpPr>
+        <p:spPr>
+          <a:xfrm>
+            <a:off x="1" y="6400800"/>
+            <a:ext cx="12192000" cy="457200"/>
+          </a:xfrm>
+          <a:prstGeom prst="rect">
+            <a:avLst/>
+          </a:prstGeom>
+          <a:solidFill>
+            <a:schemeClr val="accent2"/>
+          </a:solidFill>
+          <a:ln>
+            <a:noFill/>
+          </a:ln>
+        </p:spPr>
+        <p:style>
+          <a:lnRef idx="2">
+            <a:schemeClr val="accent1">
+              <a:shade val="50000"/>
+            </a:schemeClr>
+          </a:lnRef>
+          <a:fillRef idx="1">
+            <a:schemeClr val="accent1"/>
+          </a:fillRef>
+          <a:effectRef idx="0">
+            <a:schemeClr val="accent1"/>
+          </a:effectRef>
+          <a:fontRef idx="minor">
+            <a:schemeClr val="lt1"/>
+          </a:fontRef>
+        </p:style>
+        <p:txBody>
+          <a:bodyPr/>
+          <a:lstStyle/>
+          <a:p>
+            <a:endParaRPr lang="en-US"/>
+          </a:p>
+        </p:txBody>
+      </p:sp>
+    </p:spTree>
+    <p:extLst>
+      <p:ext uri="{BB962C8B-B14F-4D97-AF65-F5344CB8AC3E}">
+        <p14:creationId xmlns:p14="http://schemas.microsoft.com/office/powerpoint/2010/main" val="272809894"/>
+      </p:ext>
+    </p:extLst>
+  </p:cSld>
+  <p:clrMapOvr>
+    <a:masterClrMapping/>
+  </p:clrMapOvr>
+</p:sld>
+</file>
+
+<file path=ppt/slides/slide7.xml><?xml version="1.0" encoding="utf-8"?>
+<p:sld xmlns:a="http://schemas.openxmlformats.org/drawingml/2006/main" xmlns:r="http://schemas.openxmlformats.org/officeDocument/2006/relationships" xmlns:p="http://schemas.openxmlformats.org/presentationml/2006/main">
+  <p:cSld>
     <p:spTree>
       <p:nvGrpSpPr>
         <p:cNvPr id="1" name=""/>
@@ -6188,7 +7384,7 @@
 </p:sld>
 </file>
 
-<file path=ppt/slides/slide7.xml><?xml version="1.0" encoding="utf-8"?>
+<file path=ppt/slides/slide8.xml><?xml version="1.0" encoding="utf-8"?>
 <p:sld xmlns:a="http://schemas.openxmlformats.org/drawingml/2006/main" xmlns:r="http://schemas.openxmlformats.org/officeDocument/2006/relationships" xmlns:p="http://schemas.openxmlformats.org/presentationml/2006/main">
   <p:cSld>
     <p:spTree>

</xml_diff>